<commit_message>
Updating ppt for this project
</commit_message>
<xml_diff>
--- a/AI Booking Assistant.pptx
+++ b/AI Booking Assistant.pptx
@@ -5,7 +5,7 @@
     <p:sldMasterId id="2147483648" r:id="rId1"/>
   </p:sldMasterIdLst>
   <p:notesMasterIdLst>
-    <p:notesMasterId r:id="rId19"/>
+    <p:notesMasterId r:id="rId20"/>
   </p:notesMasterIdLst>
   <p:sldIdLst>
     <p:sldId id="256" r:id="rId2"/>
@@ -17,14 +17,15 @@
     <p:sldId id="262" r:id="rId8"/>
     <p:sldId id="263" r:id="rId9"/>
     <p:sldId id="264" r:id="rId10"/>
-    <p:sldId id="272" r:id="rId11"/>
-    <p:sldId id="273" r:id="rId12"/>
-    <p:sldId id="266" r:id="rId13"/>
-    <p:sldId id="267" r:id="rId14"/>
-    <p:sldId id="268" r:id="rId15"/>
-    <p:sldId id="269" r:id="rId16"/>
-    <p:sldId id="270" r:id="rId17"/>
-    <p:sldId id="271" r:id="rId18"/>
+    <p:sldId id="274" r:id="rId11"/>
+    <p:sldId id="272" r:id="rId12"/>
+    <p:sldId id="273" r:id="rId13"/>
+    <p:sldId id="266" r:id="rId14"/>
+    <p:sldId id="267" r:id="rId15"/>
+    <p:sldId id="268" r:id="rId16"/>
+    <p:sldId id="269" r:id="rId17"/>
+    <p:sldId id="270" r:id="rId18"/>
+    <p:sldId id="271" r:id="rId19"/>
   </p:sldIdLst>
   <p:sldSz cx="9144000" cy="5143500" type="screen16x9"/>
   <p:notesSz cx="5143500" cy="9144000"/>
@@ -345,6 +346,114 @@
         <p:cNvPr id="1" name="">
           <a:extLst>
             <a:ext uri="{FF2B5EF4-FFF2-40B4-BE49-F238E27FC236}">
+              <a16:creationId xmlns:a16="http://schemas.microsoft.com/office/drawing/2014/main" id="{F40A4C12-82DC-A60A-96C7-1088B928F5C7}"/>
+            </a:ext>
+          </a:extLst>
+        </p:cNvPr>
+        <p:cNvGrpSpPr/>
+        <p:nvPr/>
+      </p:nvGrpSpPr>
+      <p:grpSpPr>
+        <a:xfrm>
+          <a:off x="0" y="0"/>
+          <a:ext cx="0" cy="0"/>
+          <a:chOff x="0" y="0"/>
+          <a:chExt cx="0" cy="0"/>
+        </a:xfrm>
+      </p:grpSpPr>
+      <p:sp>
+        <p:nvSpPr>
+          <p:cNvPr id="2" name="Slide Image Placeholder 1">
+            <a:extLst>
+              <a:ext uri="{FF2B5EF4-FFF2-40B4-BE49-F238E27FC236}">
+                <a16:creationId xmlns:a16="http://schemas.microsoft.com/office/drawing/2014/main" id="{6C1751D2-8A1C-7495-0C8A-38791810BF25}"/>
+              </a:ext>
+            </a:extLst>
+          </p:cNvPr>
+          <p:cNvSpPr>
+            <a:spLocks noGrp="1" noRot="1" noChangeAspect="1"/>
+          </p:cNvSpPr>
+          <p:nvPr>
+            <p:ph type="sldImg"/>
+          </p:nvPr>
+        </p:nvSpPr>
+        <p:spPr/>
+      </p:sp>
+      <p:sp>
+        <p:nvSpPr>
+          <p:cNvPr id="3" name="Notes Placeholder 2">
+            <a:extLst>
+              <a:ext uri="{FF2B5EF4-FFF2-40B4-BE49-F238E27FC236}">
+                <a16:creationId xmlns:a16="http://schemas.microsoft.com/office/drawing/2014/main" id="{71136995-9A22-4E49-CB8D-68558FEC3BAB}"/>
+              </a:ext>
+            </a:extLst>
+          </p:cNvPr>
+          <p:cNvSpPr>
+            <a:spLocks noGrp="1"/>
+          </p:cNvSpPr>
+          <p:nvPr>
+            <p:ph type="body" idx="1"/>
+          </p:nvPr>
+        </p:nvSpPr>
+        <p:spPr/>
+        <p:txBody>
+          <a:bodyPr/>
+          <a:lstStyle/>
+          <a:p>
+            <a:endParaRPr lang="en-US" dirty="0"/>
+          </a:p>
+        </p:txBody>
+      </p:sp>
+      <p:sp>
+        <p:nvSpPr>
+          <p:cNvPr id="4" name="Slide Number Placeholder 3">
+            <a:extLst>
+              <a:ext uri="{FF2B5EF4-FFF2-40B4-BE49-F238E27FC236}">
+                <a16:creationId xmlns:a16="http://schemas.microsoft.com/office/drawing/2014/main" id="{D259FAB0-3CE1-A49C-2D92-575D4E6034EC}"/>
+              </a:ext>
+            </a:extLst>
+          </p:cNvPr>
+          <p:cNvSpPr>
+            <a:spLocks noGrp="1"/>
+          </p:cNvSpPr>
+          <p:nvPr>
+            <p:ph type="sldNum" sz="quarter" idx="10"/>
+          </p:nvPr>
+        </p:nvSpPr>
+        <p:spPr/>
+        <p:txBody>
+          <a:bodyPr/>
+          <a:lstStyle/>
+          <a:p>
+            <a:fld id="{F7021451-1387-4CA6-816F-3879F97B5CBC}" type="slidenum">
+              <a:rPr lang="en-US"/>
+              <a:t>10</a:t>
+            </a:fld>
+            <a:endParaRPr lang="en-US"/>
+          </a:p>
+        </p:txBody>
+      </p:sp>
+    </p:spTree>
+    <p:extLst>
+      <p:ext uri="{BB962C8B-B14F-4D97-AF65-F5344CB8AC3E}">
+        <p14:creationId xmlns:p14="http://schemas.microsoft.com/office/powerpoint/2010/main" val="3185398667"/>
+      </p:ext>
+    </p:extLst>
+  </p:cSld>
+  <p:clrMapOvr>
+    <a:masterClrMapping/>
+  </p:clrMapOvr>
+</p:notes>
+</file>
+
+<file path=ppt/notesSlides/notesSlide11.xml><?xml version="1.0" encoding="utf-8"?>
+<p:notes xmlns:a="http://schemas.openxmlformats.org/drawingml/2006/main" xmlns:r="http://schemas.openxmlformats.org/officeDocument/2006/relationships" xmlns:p="http://schemas.openxmlformats.org/presentationml/2006/main">
+  <p:cSld>
+    <p:spTree>
+      <p:nvGrpSpPr>
+        <p:cNvPr id="1" name="">
+          <a:extLst>
+            <a:ext uri="{FF2B5EF4-FFF2-40B4-BE49-F238E27FC236}">
               <a16:creationId xmlns:a16="http://schemas.microsoft.com/office/drawing/2014/main" id="{6AA07232-C6C7-28CA-6D67-812983F9E1F1}"/>
             </a:ext>
           </a:extLst>
@@ -426,7 +535,7 @@
           <a:p>
             <a:fld id="{F7021451-1387-4CA6-816F-3879F97B5CBC}" type="slidenum">
               <a:rPr lang="en-US"/>
-              <a:t>10</a:t>
+              <a:t>11</a:t>
             </a:fld>
             <a:endParaRPr lang="en-US"/>
           </a:p>
@@ -445,7 +554,7 @@
 </p:notes>
 </file>
 
-<file path=ppt/notesSlides/notesSlide11.xml><?xml version="1.0" encoding="utf-8"?>
+<file path=ppt/notesSlides/notesSlide12.xml><?xml version="1.0" encoding="utf-8"?>
 <p:notes xmlns:a="http://schemas.openxmlformats.org/drawingml/2006/main" xmlns:r="http://schemas.openxmlformats.org/officeDocument/2006/relationships" xmlns:p="http://schemas.openxmlformats.org/presentationml/2006/main">
   <p:cSld>
     <p:spTree>
@@ -534,7 +643,7 @@
           <a:p>
             <a:fld id="{F7021451-1387-4CA6-816F-3879F97B5CBC}" type="slidenum">
               <a:rPr lang="en-US"/>
-              <a:t>11</a:t>
+              <a:t>12</a:t>
             </a:fld>
             <a:endParaRPr lang="en-US"/>
           </a:p>
@@ -544,90 +653,6 @@
     <p:extLst>
       <p:ext uri="{BB962C8B-B14F-4D97-AF65-F5344CB8AC3E}">
         <p14:creationId xmlns:p14="http://schemas.microsoft.com/office/powerpoint/2010/main" val="3382812247"/>
-      </p:ext>
-    </p:extLst>
-  </p:cSld>
-  <p:clrMapOvr>
-    <a:masterClrMapping/>
-  </p:clrMapOvr>
-</p:notes>
-</file>
-
-<file path=ppt/notesSlides/notesSlide12.xml><?xml version="1.0" encoding="utf-8"?>
-<p:notes xmlns:a="http://schemas.openxmlformats.org/drawingml/2006/main" xmlns:r="http://schemas.openxmlformats.org/officeDocument/2006/relationships" xmlns:p="http://schemas.openxmlformats.org/presentationml/2006/main">
-  <p:cSld>
-    <p:spTree>
-      <p:nvGrpSpPr>
-        <p:cNvPr id="1" name=""/>
-        <p:cNvGrpSpPr/>
-        <p:nvPr/>
-      </p:nvGrpSpPr>
-      <p:grpSpPr>
-        <a:xfrm>
-          <a:off x="0" y="0"/>
-          <a:ext cx="0" cy="0"/>
-          <a:chOff x="0" y="0"/>
-          <a:chExt cx="0" cy="0"/>
-        </a:xfrm>
-      </p:grpSpPr>
-      <p:sp>
-        <p:nvSpPr>
-          <p:cNvPr id="2" name="Slide Image Placeholder 1"/>
-          <p:cNvSpPr>
-            <a:spLocks noGrp="1" noRot="1" noChangeAspect="1"/>
-          </p:cNvSpPr>
-          <p:nvPr>
-            <p:ph type="sldImg"/>
-          </p:nvPr>
-        </p:nvSpPr>
-        <p:spPr/>
-      </p:sp>
-      <p:sp>
-        <p:nvSpPr>
-          <p:cNvPr id="3" name="Notes Placeholder 2"/>
-          <p:cNvSpPr>
-            <a:spLocks noGrp="1"/>
-          </p:cNvSpPr>
-          <p:nvPr>
-            <p:ph type="body" idx="1"/>
-          </p:nvPr>
-        </p:nvSpPr>
-        <p:spPr/>
-        <p:txBody>
-          <a:bodyPr/>
-          <a:lstStyle/>
-          <a:p>
-            <a:endParaRPr lang="en-US" dirty="0"/>
-          </a:p>
-        </p:txBody>
-      </p:sp>
-      <p:sp>
-        <p:nvSpPr>
-          <p:cNvPr id="4" name="Slide Number Placeholder 3"/>
-          <p:cNvSpPr>
-            <a:spLocks noGrp="1"/>
-          </p:cNvSpPr>
-          <p:nvPr>
-            <p:ph type="sldNum" sz="quarter" idx="10"/>
-          </p:nvPr>
-        </p:nvSpPr>
-        <p:spPr/>
-        <p:txBody>
-          <a:bodyPr/>
-          <a:lstStyle/>
-          <a:p>
-            <a:fld id="{F7021451-1387-4CA6-816F-3879F97B5CBC}" type="slidenum">
-              <a:rPr lang="en-US"/>
-              <a:t>12</a:t>
-            </a:fld>
-            <a:endParaRPr lang="en-US"/>
-          </a:p>
-        </p:txBody>
-      </p:sp>
-    </p:spTree>
-    <p:extLst>
-      <p:ext uri="{BB962C8B-B14F-4D97-AF65-F5344CB8AC3E}">
-        <p14:creationId xmlns:p14="http://schemas.microsoft.com/office/powerpoint/2010/main" val="1024086991"/>
       </p:ext>
     </p:extLst>
   </p:cSld>
@@ -1039,6 +1064,90 @@
             <a:fld id="{F7021451-1387-4CA6-816F-3879F97B5CBC}" type="slidenum">
               <a:rPr lang="en-US"/>
               <a:t>17</a:t>
+            </a:fld>
+            <a:endParaRPr lang="en-US"/>
+          </a:p>
+        </p:txBody>
+      </p:sp>
+    </p:spTree>
+    <p:extLst>
+      <p:ext uri="{BB962C8B-B14F-4D97-AF65-F5344CB8AC3E}">
+        <p14:creationId xmlns:p14="http://schemas.microsoft.com/office/powerpoint/2010/main" val="1024086991"/>
+      </p:ext>
+    </p:extLst>
+  </p:cSld>
+  <p:clrMapOvr>
+    <a:masterClrMapping/>
+  </p:clrMapOvr>
+</p:notes>
+</file>
+
+<file path=ppt/notesSlides/notesSlide18.xml><?xml version="1.0" encoding="utf-8"?>
+<p:notes xmlns:a="http://schemas.openxmlformats.org/drawingml/2006/main" xmlns:r="http://schemas.openxmlformats.org/officeDocument/2006/relationships" xmlns:p="http://schemas.openxmlformats.org/presentationml/2006/main">
+  <p:cSld>
+    <p:spTree>
+      <p:nvGrpSpPr>
+        <p:cNvPr id="1" name=""/>
+        <p:cNvGrpSpPr/>
+        <p:nvPr/>
+      </p:nvGrpSpPr>
+      <p:grpSpPr>
+        <a:xfrm>
+          <a:off x="0" y="0"/>
+          <a:ext cx="0" cy="0"/>
+          <a:chOff x="0" y="0"/>
+          <a:chExt cx="0" cy="0"/>
+        </a:xfrm>
+      </p:grpSpPr>
+      <p:sp>
+        <p:nvSpPr>
+          <p:cNvPr id="2" name="Slide Image Placeholder 1"/>
+          <p:cNvSpPr>
+            <a:spLocks noGrp="1" noRot="1" noChangeAspect="1"/>
+          </p:cNvSpPr>
+          <p:nvPr>
+            <p:ph type="sldImg"/>
+          </p:nvPr>
+        </p:nvSpPr>
+        <p:spPr/>
+      </p:sp>
+      <p:sp>
+        <p:nvSpPr>
+          <p:cNvPr id="3" name="Notes Placeholder 2"/>
+          <p:cNvSpPr>
+            <a:spLocks noGrp="1"/>
+          </p:cNvSpPr>
+          <p:nvPr>
+            <p:ph type="body" idx="1"/>
+          </p:nvPr>
+        </p:nvSpPr>
+        <p:spPr/>
+        <p:txBody>
+          <a:bodyPr/>
+          <a:lstStyle/>
+          <a:p>
+            <a:endParaRPr lang="en-US" dirty="0"/>
+          </a:p>
+        </p:txBody>
+      </p:sp>
+      <p:sp>
+        <p:nvSpPr>
+          <p:cNvPr id="4" name="Slide Number Placeholder 3"/>
+          <p:cNvSpPr>
+            <a:spLocks noGrp="1"/>
+          </p:cNvSpPr>
+          <p:nvPr>
+            <p:ph type="sldNum" sz="quarter" idx="10"/>
+          </p:nvPr>
+        </p:nvSpPr>
+        <p:spPr/>
+        <p:txBody>
+          <a:bodyPr/>
+          <a:lstStyle/>
+          <a:p>
+            <a:fld id="{F7021451-1387-4CA6-816F-3879F97B5CBC}" type="slidenum">
+              <a:rPr lang="en-US"/>
+              <a:t>18</a:t>
             </a:fld>
             <a:endParaRPr lang="en-US"/>
           </a:p>
@@ -2158,8 +2267,8 @@
         </p:nvSpPr>
         <p:spPr>
           <a:xfrm>
-            <a:off x="3200400" y="3335655"/>
-            <a:ext cx="2617492" cy="240030"/>
+            <a:off x="3443751" y="3335655"/>
+            <a:ext cx="4206241" cy="240030"/>
           </a:xfrm>
           <a:prstGeom prst="rect">
             <a:avLst/>
@@ -2171,28 +2280,161 @@
           <a:bodyPr wrap="square" lIns="0" tIns="0" rIns="0" bIns="0" rtlCol="0" anchor="t"/>
           <a:lstStyle/>
           <a:p>
-            <a:pPr marL="0" indent="0" algn="ctr">
+            <a:pPr algn="ctr">
               <a:lnSpc>
                 <a:spcPts val="1890"/>
               </a:lnSpc>
+            </a:pPr>
+            <a:r>
+              <a:rPr lang="en-US" sz="1350" dirty="0">
+                <a:solidFill>
+                  <a:srgbClr val="94A3B8"/>
+                </a:solidFill>
+                <a:latin typeface="Arial" pitchFamily="34" charset="0"/>
+                <a:ea typeface="Arial" pitchFamily="34" charset="-122"/>
+                <a:cs typeface="Arial" pitchFamily="34" charset="-120"/>
+              </a:rPr>
+              <a:t>HANS RAJ • 2022BCE07AED190 • Alliance University</a:t>
+            </a:r>
+            <a:endParaRPr lang="en-US" sz="1350" dirty="0"/>
+          </a:p>
+        </p:txBody>
+      </p:sp>
+    </p:spTree>
+  </p:cSld>
+  <p:clrMapOvr>
+    <a:masterClrMapping/>
+  </p:clrMapOvr>
+  <mc:AlternateContent xmlns:mc="http://schemas.openxmlformats.org/markup-compatibility/2006" xmlns:p159="http://schemas.microsoft.com/office/powerpoint/2015/09/main">
+    <mc:Choice Requires="p159">
+      <p:transition xmlns:p14="http://schemas.microsoft.com/office/powerpoint/2010/main" spd="slow" p14:dur="2000">
+        <p159:morph option="byObject"/>
+      </p:transition>
+    </mc:Choice>
+    <mc:Fallback xmlns="">
+      <p:transition spd="slow">
+        <p:fade/>
+      </p:transition>
+    </mc:Fallback>
+  </mc:AlternateContent>
+</p:sld>
+</file>
+
+<file path=ppt/slides/slide10.xml><?xml version="1.0" encoding="utf-8"?>
+<p:sld xmlns:a="http://schemas.openxmlformats.org/drawingml/2006/main" xmlns:r="http://schemas.openxmlformats.org/officeDocument/2006/relationships" xmlns:p="http://schemas.openxmlformats.org/presentationml/2006/main">
+  <p:cSld>
+    <p:bg>
+      <p:bgPr>
+        <a:solidFill>
+          <a:srgbClr val="0F172A"/>
+        </a:solidFill>
+        <a:effectLst/>
+      </p:bgPr>
+    </p:bg>
+    <p:spTree>
+      <p:nvGrpSpPr>
+        <p:cNvPr id="1" name="">
+          <a:extLst>
+            <a:ext uri="{FF2B5EF4-FFF2-40B4-BE49-F238E27FC236}">
+              <a16:creationId xmlns:a16="http://schemas.microsoft.com/office/drawing/2014/main" id="{1E0D7C6B-9815-84BB-551C-5A371A66AFCF}"/>
+            </a:ext>
+          </a:extLst>
+        </p:cNvPr>
+        <p:cNvGrpSpPr/>
+        <p:nvPr/>
+      </p:nvGrpSpPr>
+      <p:grpSpPr>
+        <a:xfrm>
+          <a:off x="0" y="0"/>
+          <a:ext cx="0" cy="0"/>
+          <a:chOff x="0" y="0"/>
+          <a:chExt cx="0" cy="0"/>
+        </a:xfrm>
+      </p:grpSpPr>
+      <p:sp>
+        <p:nvSpPr>
+          <p:cNvPr id="2" name="Text 0">
+            <a:extLst>
+              <a:ext uri="{FF2B5EF4-FFF2-40B4-BE49-F238E27FC236}">
+                <a16:creationId xmlns:a16="http://schemas.microsoft.com/office/drawing/2014/main" id="{2AB2E28D-6CB5-3823-2BD5-042F7B0E32CF}"/>
+              </a:ext>
+            </a:extLst>
+          </p:cNvPr>
+          <p:cNvSpPr/>
+          <p:nvPr/>
+        </p:nvSpPr>
+        <p:spPr>
+          <a:xfrm>
+            <a:off x="177553" y="103003"/>
+            <a:ext cx="8083296" cy="411480"/>
+          </a:xfrm>
+          <a:prstGeom prst="rect">
+            <a:avLst/>
+          </a:prstGeom>
+          <a:noFill/>
+          <a:ln/>
+        </p:spPr>
+        <p:txBody>
+          <a:bodyPr wrap="square" lIns="0" tIns="0" rIns="0" bIns="0" rtlCol="0" anchor="t"/>
+          <a:lstStyle/>
+          <a:p>
+            <a:pPr marL="0" indent="0">
+              <a:lnSpc>
+                <a:spcPts val="3240"/>
+              </a:lnSpc>
               <a:buNone/>
             </a:pPr>
             <a:r>
-              <a:rPr lang="en-US" sz="1350" dirty="0">
-                <a:solidFill>
-                  <a:srgbClr val="94A3B8"/>
-                </a:solidFill>
-                <a:latin typeface="Arial" pitchFamily="34" charset="0"/>
-                <a:ea typeface="Arial" pitchFamily="34" charset="-122"/>
-                <a:cs typeface="Arial" pitchFamily="34" charset="-120"/>
-              </a:rPr>
-              <a:t>HANS RAJ • 2022BCE07AED190</a:t>
-            </a:r>
-            <a:endParaRPr lang="en-US" sz="1350" dirty="0"/>
-          </a:p>
-        </p:txBody>
-      </p:sp>
+              <a:rPr lang="en-US" sz="2700" b="1" dirty="0">
+                <a:solidFill>
+                  <a:srgbClr val="38BDF8"/>
+                </a:solidFill>
+                <a:latin typeface="Arial" pitchFamily="34" charset="0"/>
+                <a:ea typeface="Arial" pitchFamily="34" charset="-122"/>
+                <a:cs typeface="Arial" pitchFamily="34" charset="-120"/>
+              </a:rPr>
+              <a:t>Screenshots: Chat Interface With RAG Use Case</a:t>
+            </a:r>
+            <a:endParaRPr lang="en-US" sz="2700" dirty="0"/>
+          </a:p>
+        </p:txBody>
+      </p:sp>
+      <p:pic>
+        <p:nvPicPr>
+          <p:cNvPr id="4" name="Picture 3">
+            <a:extLst>
+              <a:ext uri="{FF2B5EF4-FFF2-40B4-BE49-F238E27FC236}">
+                <a16:creationId xmlns:a16="http://schemas.microsoft.com/office/drawing/2014/main" id="{EE9E0A8E-E987-6CD6-2EA9-598C68887F9C}"/>
+              </a:ext>
+            </a:extLst>
+          </p:cNvPr>
+          <p:cNvPicPr>
+            <a:picLocks noChangeAspect="1"/>
+          </p:cNvPicPr>
+          <p:nvPr/>
+        </p:nvPicPr>
+        <p:blipFill>
+          <a:blip r:embed="rId3"/>
+          <a:stretch>
+            <a:fillRect/>
+          </a:stretch>
+        </p:blipFill>
+        <p:spPr>
+          <a:xfrm>
+            <a:off x="510540" y="784859"/>
+            <a:ext cx="7955280" cy="4134745"/>
+          </a:xfrm>
+          <a:prstGeom prst="rect">
+            <a:avLst/>
+          </a:prstGeom>
+        </p:spPr>
+      </p:pic>
     </p:spTree>
+    <p:extLst>
+      <p:ext uri="{BB962C8B-B14F-4D97-AF65-F5344CB8AC3E}">
+        <p14:creationId xmlns:p14="http://schemas.microsoft.com/office/powerpoint/2010/main" val="2592196421"/>
+      </p:ext>
+    </p:extLst>
   </p:cSld>
   <p:clrMapOvr>
     <a:masterClrMapping/>
@@ -2212,7 +2454,7 @@
 </p:sld>
 </file>
 
-<file path=ppt/slides/slide10.xml><?xml version="1.0" encoding="utf-8"?>
+<file path=ppt/slides/slide11.xml><?xml version="1.0" encoding="utf-8"?>
 <p:sld xmlns:a="http://schemas.openxmlformats.org/drawingml/2006/main" xmlns:r="http://schemas.openxmlformats.org/officeDocument/2006/relationships" xmlns:p="http://schemas.openxmlformats.org/presentationml/2006/main">
   <p:cSld>
     <p:bg>
@@ -2331,13 +2573,13 @@
   <p:clrMapOvr>
     <a:masterClrMapping/>
   </p:clrMapOvr>
-  <mc:AlternateContent xmlns:mc="http://schemas.openxmlformats.org/markup-compatibility/2006">
-    <mc:Choice xmlns:p159="http://schemas.microsoft.com/office/powerpoint/2015/09/main" Requires="p159">
+  <mc:AlternateContent xmlns:mc="http://schemas.openxmlformats.org/markup-compatibility/2006" xmlns:p159="http://schemas.microsoft.com/office/powerpoint/2015/09/main">
+    <mc:Choice Requires="p159">
       <p:transition xmlns:p14="http://schemas.microsoft.com/office/powerpoint/2010/main" spd="slow" p14:dur="2000">
         <p159:morph option="byObject"/>
       </p:transition>
     </mc:Choice>
-    <mc:Fallback>
+    <mc:Fallback xmlns="">
       <p:transition spd="slow">
         <p:fade/>
       </p:transition>
@@ -2346,7 +2588,7 @@
 </p:sld>
 </file>
 
-<file path=ppt/slides/slide11.xml><?xml version="1.0" encoding="utf-8"?>
+<file path=ppt/slides/slide12.xml><?xml version="1.0" encoding="utf-8"?>
 <p:sld xmlns:a="http://schemas.openxmlformats.org/drawingml/2006/main" xmlns:r="http://schemas.openxmlformats.org/officeDocument/2006/relationships" xmlns:p="http://schemas.openxmlformats.org/presentationml/2006/main">
   <p:cSld>
     <p:bg>
@@ -2487,13 +2729,13 @@
   <p:clrMapOvr>
     <a:masterClrMapping/>
   </p:clrMapOvr>
-  <mc:AlternateContent xmlns:mc="http://schemas.openxmlformats.org/markup-compatibility/2006">
-    <mc:Choice xmlns:p159="http://schemas.microsoft.com/office/powerpoint/2015/09/main" Requires="p159">
+  <mc:AlternateContent xmlns:mc="http://schemas.openxmlformats.org/markup-compatibility/2006" xmlns:p159="http://schemas.microsoft.com/office/powerpoint/2015/09/main">
+    <mc:Choice Requires="p159">
       <p:transition xmlns:p14="http://schemas.microsoft.com/office/powerpoint/2010/main" spd="slow" p14:dur="2000">
         <p159:morph option="byObject"/>
       </p:transition>
     </mc:Choice>
-    <mc:Fallback>
+    <mc:Fallback xmlns="">
       <p:transition spd="slow">
         <p:fade/>
       </p:transition>
@@ -2502,7 +2744,7 @@
 </p:sld>
 </file>
 
-<file path=ppt/slides/slide12.xml><?xml version="1.0" encoding="utf-8"?>
+<file path=ppt/slides/slide13.xml><?xml version="1.0" encoding="utf-8"?>
 <p:sld xmlns:a="http://schemas.openxmlformats.org/drawingml/2006/main" xmlns:r="http://schemas.openxmlformats.org/officeDocument/2006/relationships" xmlns:p="http://schemas.openxmlformats.org/presentationml/2006/main">
   <p:cSld name="Slide 11">
     <p:bg>
@@ -2724,13 +2966,13 @@
   <p:clrMapOvr>
     <a:masterClrMapping/>
   </p:clrMapOvr>
-  <mc:AlternateContent xmlns:mc="http://schemas.openxmlformats.org/markup-compatibility/2006">
-    <mc:Choice xmlns:p159="http://schemas.microsoft.com/office/powerpoint/2015/09/main" Requires="p159">
+  <mc:AlternateContent xmlns:mc="http://schemas.openxmlformats.org/markup-compatibility/2006" xmlns:p159="http://schemas.microsoft.com/office/powerpoint/2015/09/main">
+    <mc:Choice Requires="p159">
       <p:transition xmlns:p14="http://schemas.microsoft.com/office/powerpoint/2010/main" spd="slow" p14:dur="2000">
         <p159:morph option="byObject"/>
       </p:transition>
     </mc:Choice>
-    <mc:Fallback>
+    <mc:Fallback xmlns="">
       <p:transition spd="slow">
         <p:fade/>
       </p:transition>
@@ -2739,7 +2981,7 @@
 </p:sld>
 </file>
 
-<file path=ppt/slides/slide13.xml><?xml version="1.0" encoding="utf-8"?>
+<file path=ppt/slides/slide14.xml><?xml version="1.0" encoding="utf-8"?>
 <p:sld xmlns:a="http://schemas.openxmlformats.org/drawingml/2006/main" xmlns:r="http://schemas.openxmlformats.org/officeDocument/2006/relationships" xmlns:p="http://schemas.openxmlformats.org/presentationml/2006/main">
   <p:cSld name="Slide 12">
     <p:bg>
@@ -2961,13 +3203,13 @@
   <p:clrMapOvr>
     <a:masterClrMapping/>
   </p:clrMapOvr>
-  <mc:AlternateContent xmlns:mc="http://schemas.openxmlformats.org/markup-compatibility/2006">
-    <mc:Choice xmlns:p159="http://schemas.microsoft.com/office/powerpoint/2015/09/main" Requires="p159">
+  <mc:AlternateContent xmlns:mc="http://schemas.openxmlformats.org/markup-compatibility/2006" xmlns:p159="http://schemas.microsoft.com/office/powerpoint/2015/09/main">
+    <mc:Choice Requires="p159">
       <p:transition xmlns:p14="http://schemas.microsoft.com/office/powerpoint/2010/main" spd="slow" p14:dur="2000">
         <p159:morph option="byObject"/>
       </p:transition>
     </mc:Choice>
-    <mc:Fallback>
+    <mc:Fallback xmlns="">
       <p:transition spd="slow">
         <p:fade/>
       </p:transition>
@@ -2976,7 +3218,7 @@
 </p:sld>
 </file>
 
-<file path=ppt/slides/slide14.xml><?xml version="1.0" encoding="utf-8"?>
+<file path=ppt/slides/slide15.xml><?xml version="1.0" encoding="utf-8"?>
 <p:sld xmlns:a="http://schemas.openxmlformats.org/drawingml/2006/main" xmlns:r="http://schemas.openxmlformats.org/officeDocument/2006/relationships" xmlns:p="http://schemas.openxmlformats.org/presentationml/2006/main">
   <p:cSld name="Slide 13">
     <p:bg>
@@ -3230,13 +3472,13 @@
   <p:clrMapOvr>
     <a:masterClrMapping/>
   </p:clrMapOvr>
-  <mc:AlternateContent xmlns:mc="http://schemas.openxmlformats.org/markup-compatibility/2006">
-    <mc:Choice xmlns:p159="http://schemas.microsoft.com/office/powerpoint/2015/09/main" Requires="p159">
+  <mc:AlternateContent xmlns:mc="http://schemas.openxmlformats.org/markup-compatibility/2006" xmlns:p159="http://schemas.microsoft.com/office/powerpoint/2015/09/main">
+    <mc:Choice Requires="p159">
       <p:transition xmlns:p14="http://schemas.microsoft.com/office/powerpoint/2010/main" spd="slow" p14:dur="2000">
         <p159:morph option="byObject"/>
       </p:transition>
     </mc:Choice>
-    <mc:Fallback>
+    <mc:Fallback xmlns="">
       <p:transition spd="slow">
         <p:fade/>
       </p:transition>
@@ -3245,7 +3487,7 @@
 </p:sld>
 </file>
 
-<file path=ppt/slides/slide15.xml><?xml version="1.0" encoding="utf-8"?>
+<file path=ppt/slides/slide16.xml><?xml version="1.0" encoding="utf-8"?>
 <p:sld xmlns:a="http://schemas.openxmlformats.org/drawingml/2006/main" xmlns:r="http://schemas.openxmlformats.org/officeDocument/2006/relationships" xmlns:p="http://schemas.openxmlformats.org/presentationml/2006/main">
   <p:cSld name="Slide 14">
     <p:bg>
@@ -3392,9 +3634,27 @@
                 <a:ea typeface="Arial" pitchFamily="34" charset="-122"/>
                 <a:cs typeface="Arial" pitchFamily="34" charset="-120"/>
               </a:rPr>
-              <a:t> Render</a:t>
-            </a:r>
-            <a:endParaRPr lang="en-US" sz="1350" dirty="0"/>
+              <a:t> </a:t>
+            </a:r>
+            <a:r>
+              <a:rPr lang="en-US" sz="1350" dirty="0" err="1">
+                <a:solidFill>
+                  <a:srgbClr val="CBD5E1"/>
+                </a:solidFill>
+                <a:latin typeface="Arial" pitchFamily="34" charset="0"/>
+                <a:ea typeface="Arial" pitchFamily="34" charset="-122"/>
+                <a:cs typeface="Arial" pitchFamily="34" charset="-120"/>
+              </a:rPr>
+              <a:t>Streamlit</a:t>
+            </a:r>
+            <a:endParaRPr lang="en-US" sz="1350" dirty="0">
+              <a:solidFill>
+                <a:srgbClr val="CBD5E1"/>
+              </a:solidFill>
+              <a:latin typeface="Arial" pitchFamily="34" charset="0"/>
+              <a:ea typeface="Arial" pitchFamily="34" charset="-122"/>
+              <a:cs typeface="Arial" pitchFamily="34" charset="-120"/>
+            </a:endParaRPr>
           </a:p>
           <a:p>
             <a:pPr marL="342900" indent="-342900">
@@ -3578,25 +3838,20 @@
             </a:endParaRPr>
           </a:p>
           <a:p>
-            <a:pPr marL="342900" indent="-342900">
+            <a:pPr>
               <a:lnSpc>
                 <a:spcPts val="2430"/>
               </a:lnSpc>
               <a:buSzPct val="100000"/>
-              <a:buFontTx/>
-              <a:buChar char="•"/>
-            </a:pPr>
-            <a:r>
-              <a:rPr lang="en-US" sz="1350" dirty="0">
-                <a:solidFill>
-                  <a:srgbClr val="38BDF8"/>
-                </a:solidFill>
-                <a:latin typeface="Arial" pitchFamily="34" charset="0"/>
-                <a:ea typeface="Arial" pitchFamily="34" charset="-122"/>
-                <a:cs typeface="Arial" pitchFamily="34" charset="-120"/>
-              </a:rPr>
-              <a:t>Production link:</a:t>
-            </a:r>
+            </a:pPr>
+            <a:endParaRPr lang="en-US" sz="1350" dirty="0">
+              <a:solidFill>
+                <a:srgbClr val="38BDF8"/>
+              </a:solidFill>
+              <a:latin typeface="Arial" pitchFamily="34" charset="0"/>
+              <a:ea typeface="Arial" pitchFamily="34" charset="-122"/>
+              <a:cs typeface="Arial" pitchFamily="34" charset="-120"/>
+            </a:endParaRPr>
           </a:p>
           <a:p>
             <a:pPr marL="342900" indent="-342900">
@@ -3649,13 +3904,13 @@
   <p:clrMapOvr>
     <a:masterClrMapping/>
   </p:clrMapOvr>
-  <mc:AlternateContent xmlns:mc="http://schemas.openxmlformats.org/markup-compatibility/2006">
-    <mc:Choice xmlns:p159="http://schemas.microsoft.com/office/powerpoint/2015/09/main" Requires="p159">
+  <mc:AlternateContent xmlns:mc="http://schemas.openxmlformats.org/markup-compatibility/2006" xmlns:p159="http://schemas.microsoft.com/office/powerpoint/2015/09/main">
+    <mc:Choice Requires="p159">
       <p:transition xmlns:p14="http://schemas.microsoft.com/office/powerpoint/2010/main" spd="slow" p14:dur="2000">
         <p159:morph option="byObject"/>
       </p:transition>
     </mc:Choice>
-    <mc:Fallback>
+    <mc:Fallback xmlns="">
       <p:transition spd="slow">
         <p:fade/>
       </p:transition>
@@ -3664,7 +3919,7 @@
 </p:sld>
 </file>
 
-<file path=ppt/slides/slide16.xml><?xml version="1.0" encoding="utf-8"?>
+<file path=ppt/slides/slide17.xml><?xml version="1.0" encoding="utf-8"?>
 <p:sld xmlns:a="http://schemas.openxmlformats.org/drawingml/2006/main" xmlns:r="http://schemas.openxmlformats.org/officeDocument/2006/relationships" xmlns:p="http://schemas.openxmlformats.org/presentationml/2006/main">
   <p:cSld name="Slide 15">
     <p:bg>
@@ -3842,13 +4097,13 @@
   <p:clrMapOvr>
     <a:masterClrMapping/>
   </p:clrMapOvr>
-  <mc:AlternateContent xmlns:mc="http://schemas.openxmlformats.org/markup-compatibility/2006">
-    <mc:Choice xmlns:p159="http://schemas.microsoft.com/office/powerpoint/2015/09/main" Requires="p159">
+  <mc:AlternateContent xmlns:mc="http://schemas.openxmlformats.org/markup-compatibility/2006" xmlns:p159="http://schemas.microsoft.com/office/powerpoint/2015/09/main">
+    <mc:Choice Requires="p159">
       <p:transition xmlns:p14="http://schemas.microsoft.com/office/powerpoint/2010/main" spd="slow" p14:dur="2000">
         <p159:morph option="byObject"/>
       </p:transition>
     </mc:Choice>
-    <mc:Fallback>
+    <mc:Fallback xmlns="">
       <p:transition spd="slow">
         <p:fade/>
       </p:transition>
@@ -3857,7 +4112,7 @@
 </p:sld>
 </file>
 
-<file path=ppt/slides/slide17.xml><?xml version="1.0" encoding="utf-8"?>
+<file path=ppt/slides/slide18.xml><?xml version="1.0" encoding="utf-8"?>
 <p:sld xmlns:a="http://schemas.openxmlformats.org/drawingml/2006/main" xmlns:r="http://schemas.openxmlformats.org/officeDocument/2006/relationships" xmlns:p="http://schemas.openxmlformats.org/presentationml/2006/main">
   <p:cSld name="Slide 16">
     <p:bg>
@@ -4054,13 +4309,13 @@
   <p:clrMapOvr>
     <a:masterClrMapping/>
   </p:clrMapOvr>
-  <mc:AlternateContent xmlns:mc="http://schemas.openxmlformats.org/markup-compatibility/2006">
-    <mc:Choice xmlns:p159="http://schemas.microsoft.com/office/powerpoint/2015/09/main" Requires="p159">
+  <mc:AlternateContent xmlns:mc="http://schemas.openxmlformats.org/markup-compatibility/2006" xmlns:p159="http://schemas.microsoft.com/office/powerpoint/2015/09/main">
+    <mc:Choice Requires="p159">
       <p:transition xmlns:p14="http://schemas.microsoft.com/office/powerpoint/2010/main" spd="slow" p14:dur="2000">
         <p159:morph option="byObject"/>
       </p:transition>
     </mc:Choice>
-    <mc:Fallback>
+    <mc:Fallback xmlns="">
       <p:transition spd="slow">
         <p:fade/>
       </p:transition>
@@ -4291,13 +4546,13 @@
   <p:clrMapOvr>
     <a:masterClrMapping/>
   </p:clrMapOvr>
-  <mc:AlternateContent xmlns:mc="http://schemas.openxmlformats.org/markup-compatibility/2006">
-    <mc:Choice xmlns:p159="http://schemas.microsoft.com/office/powerpoint/2015/09/main" Requires="p159">
+  <mc:AlternateContent xmlns:mc="http://schemas.openxmlformats.org/markup-compatibility/2006" xmlns:p159="http://schemas.microsoft.com/office/powerpoint/2015/09/main">
+    <mc:Choice Requires="p159">
       <p:transition xmlns:p14="http://schemas.microsoft.com/office/powerpoint/2010/main" spd="slow" p14:dur="2000">
         <p159:morph option="byObject"/>
       </p:transition>
     </mc:Choice>
-    <mc:Fallback>
+    <mc:Fallback xmlns="">
       <p:transition spd="slow">
         <p:fade/>
       </p:transition>
@@ -4528,13 +4783,13 @@
   <p:clrMapOvr>
     <a:masterClrMapping/>
   </p:clrMapOvr>
-  <mc:AlternateContent xmlns:mc="http://schemas.openxmlformats.org/markup-compatibility/2006">
-    <mc:Choice xmlns:p159="http://schemas.microsoft.com/office/powerpoint/2015/09/main" Requires="p159">
+  <mc:AlternateContent xmlns:mc="http://schemas.openxmlformats.org/markup-compatibility/2006" xmlns:p159="http://schemas.microsoft.com/office/powerpoint/2015/09/main">
+    <mc:Choice Requires="p159">
       <p:transition xmlns:p14="http://schemas.microsoft.com/office/powerpoint/2010/main" spd="slow" p14:dur="2000">
         <p159:morph option="byObject"/>
       </p:transition>
     </mc:Choice>
-    <mc:Fallback>
+    <mc:Fallback xmlns="">
       <p:transition spd="slow">
         <p:fade/>
       </p:transition>
@@ -5353,13 +5608,13 @@
   <p:clrMapOvr>
     <a:masterClrMapping/>
   </p:clrMapOvr>
-  <mc:AlternateContent xmlns:mc="http://schemas.openxmlformats.org/markup-compatibility/2006">
-    <mc:Choice xmlns:p159="http://schemas.microsoft.com/office/powerpoint/2015/09/main" Requires="p159">
+  <mc:AlternateContent xmlns:mc="http://schemas.openxmlformats.org/markup-compatibility/2006" xmlns:p159="http://schemas.microsoft.com/office/powerpoint/2015/09/main">
+    <mc:Choice Requires="p159">
       <p:transition xmlns:p14="http://schemas.microsoft.com/office/powerpoint/2010/main" spd="slow" p14:dur="2000">
         <p159:morph option="byObject"/>
       </p:transition>
     </mc:Choice>
-    <mc:Fallback>
+    <mc:Fallback xmlns="">
       <p:transition spd="slow">
         <p:fade/>
       </p:transition>
@@ -5666,11 +5921,10 @@
           <a:bodyPr wrap="square" lIns="0" tIns="0" rIns="0" bIns="0" rtlCol="0" anchor="t"/>
           <a:lstStyle/>
           <a:p>
-            <a:pPr marL="0" indent="0">
+            <a:pPr>
               <a:lnSpc>
                 <a:spcPts val="1728"/>
               </a:lnSpc>
-              <a:buNone/>
             </a:pPr>
             <a:r>
               <a:rPr lang="en-US" sz="1080" dirty="0">
@@ -5681,7 +5935,29 @@
                 <a:ea typeface="Arial" pitchFamily="34" charset="-122"/>
                 <a:cs typeface="Arial" pitchFamily="34" charset="-120"/>
               </a:rPr>
-              <a:t>↓ (Form Validation)</a:t>
+              <a:t>↓ (Form Validation + </a:t>
+            </a:r>
+            <a:r>
+              <a:rPr lang="en-US" sz="1080" dirty="0" err="1">
+                <a:solidFill>
+                  <a:srgbClr val="CBD5E1"/>
+                </a:solidFill>
+                <a:latin typeface="Arial" pitchFamily="34" charset="0"/>
+                <a:ea typeface="Arial" pitchFamily="34" charset="-122"/>
+                <a:cs typeface="Arial" pitchFamily="34" charset="-120"/>
+              </a:rPr>
+              <a:t>Groq</a:t>
+            </a:r>
+            <a:r>
+              <a:rPr lang="en-US" sz="1080" dirty="0">
+                <a:solidFill>
+                  <a:srgbClr val="CBD5E1"/>
+                </a:solidFill>
+                <a:latin typeface="Arial" pitchFamily="34" charset="0"/>
+                <a:ea typeface="Arial" pitchFamily="34" charset="-122"/>
+                <a:cs typeface="Arial" pitchFamily="34" charset="-120"/>
+              </a:rPr>
+              <a:t> LLM )</a:t>
             </a:r>
             <a:endParaRPr lang="en-US" sz="1080" dirty="0"/>
           </a:p>
@@ -5776,13 +6052,13 @@
   <p:clrMapOvr>
     <a:masterClrMapping/>
   </p:clrMapOvr>
-  <mc:AlternateContent xmlns:mc="http://schemas.openxmlformats.org/markup-compatibility/2006">
-    <mc:Choice xmlns:p159="http://schemas.microsoft.com/office/powerpoint/2015/09/main" Requires="p159">
+  <mc:AlternateContent xmlns:mc="http://schemas.openxmlformats.org/markup-compatibility/2006" xmlns:p159="http://schemas.microsoft.com/office/powerpoint/2015/09/main">
+    <mc:Choice Requires="p159">
       <p:transition xmlns:p14="http://schemas.microsoft.com/office/powerpoint/2010/main" spd="slow" p14:dur="2000">
         <p159:morph option="byObject"/>
       </p:transition>
     </mc:Choice>
-    <mc:Fallback>
+    <mc:Fallback xmlns="">
       <p:transition spd="slow">
         <p:fade/>
       </p:transition>
@@ -5867,7 +6143,7 @@
         <p:spPr>
           <a:xfrm>
             <a:off x="914400" y="1249680"/>
-            <a:ext cx="7620000" cy="2000250"/>
+            <a:ext cx="7620000" cy="2661138"/>
           </a:xfrm>
           <a:prstGeom prst="rect">
             <a:avLst/>
@@ -5895,20 +6171,30 @@
                 <a:ea typeface="Arial" pitchFamily="34" charset="-122"/>
                 <a:cs typeface="Arial" pitchFamily="34" charset="-120"/>
               </a:rPr>
-              <a:t>Step 1 - Greeting:</a:t>
-            </a:r>
-            <a:r>
-              <a:rPr lang="en-US" sz="1350" dirty="0">
-                <a:solidFill>
-                  <a:srgbClr val="CBD5E1"/>
-                </a:solidFill>
-                <a:latin typeface="Arial" pitchFamily="34" charset="0"/>
-                <a:ea typeface="Arial" pitchFamily="34" charset="-122"/>
-                <a:cs typeface="Arial" pitchFamily="34" charset="-120"/>
-              </a:rPr>
-              <a:t> User says "hi" or "book hotel"</a:t>
-            </a:r>
-            <a:endParaRPr lang="en-US" sz="1350" dirty="0"/>
+              <a:t>Step 1 – Greeting / Intent Detection Detects "hi", "book hotel", or PDF </a:t>
+            </a:r>
+            <a:r>
+              <a:rPr lang="en-US" sz="1350" b="1" dirty="0" err="1">
+                <a:solidFill>
+                  <a:srgbClr val="38BDF8"/>
+                </a:solidFill>
+                <a:latin typeface="Arial" pitchFamily="34" charset="0"/>
+                <a:ea typeface="Arial" pitchFamily="34" charset="-122"/>
+                <a:cs typeface="Arial" pitchFamily="34" charset="-120"/>
+              </a:rPr>
+              <a:t>queriesResponds</a:t>
+            </a:r>
+            <a:r>
+              <a:rPr lang="en-US" sz="1350" b="1" dirty="0">
+                <a:solidFill>
+                  <a:srgbClr val="38BDF8"/>
+                </a:solidFill>
+                <a:latin typeface="Arial" pitchFamily="34" charset="0"/>
+                <a:ea typeface="Arial" pitchFamily="34" charset="-122"/>
+                <a:cs typeface="Arial" pitchFamily="34" charset="-120"/>
+              </a:rPr>
+              <a:t> with greeting or RAG answer</a:t>
+            </a:r>
           </a:p>
           <a:p>
             <a:pPr marL="342900" indent="-342900">
@@ -5927,20 +6213,8 @@
                 <a:ea typeface="Arial" pitchFamily="34" charset="-122"/>
                 <a:cs typeface="Arial" pitchFamily="34" charset="-120"/>
               </a:rPr>
-              <a:t>Step 2 - Collection:</a:t>
-            </a:r>
-            <a:r>
-              <a:rPr lang="en-US" sz="1350" dirty="0">
-                <a:solidFill>
-                  <a:srgbClr val="CBD5E1"/>
-                </a:solidFill>
-                <a:latin typeface="Arial" pitchFamily="34" charset="0"/>
-                <a:ea typeface="Arial" pitchFamily="34" charset="-122"/>
-                <a:cs typeface="Arial" pitchFamily="34" charset="-120"/>
-              </a:rPr>
-              <a:t> Name → Email → Phone → Service Type</a:t>
-            </a:r>
-            <a:endParaRPr lang="en-US" sz="1350" dirty="0"/>
+              <a:t>Step 2 – Entity Collection Extracts info via LLM: name, email, phone, booking type Prompts only for missing fields</a:t>
+            </a:r>
           </a:p>
           <a:p>
             <a:pPr marL="342900" indent="-342900">
@@ -5959,20 +6233,8 @@
                 <a:ea typeface="Arial" pitchFamily="34" charset="-122"/>
                 <a:cs typeface="Arial" pitchFamily="34" charset="-120"/>
               </a:rPr>
-              <a:t>Step 3 - Date/Time:</a:t>
-            </a:r>
-            <a:r>
-              <a:rPr lang="en-US" sz="1350" dirty="0">
-                <a:solidFill>
-                  <a:srgbClr val="CBD5E1"/>
-                </a:solidFill>
-                <a:latin typeface="Arial" pitchFamily="34" charset="0"/>
-                <a:ea typeface="Arial" pitchFamily="34" charset="-122"/>
-                <a:cs typeface="Arial" pitchFamily="34" charset="-120"/>
-              </a:rPr>
-              <a:t> Preferred booking date &amp; time</a:t>
-            </a:r>
-            <a:endParaRPr lang="en-US" sz="1350" dirty="0"/>
+              <a:t>Step 3 – Date &amp; Time Collects date and time if not already provided</a:t>
+            </a:r>
           </a:p>
           <a:p>
             <a:pPr marL="342900" indent="-342900">
@@ -5991,20 +6253,8 @@
                 <a:ea typeface="Arial" pitchFamily="34" charset="-122"/>
                 <a:cs typeface="Arial" pitchFamily="34" charset="-120"/>
               </a:rPr>
-              <a:t>Step 4 - Review:</a:t>
-            </a:r>
-            <a:r>
-              <a:rPr lang="en-US" sz="1350" dirty="0">
-                <a:solidFill>
-                  <a:srgbClr val="CBD5E1"/>
-                </a:solidFill>
-                <a:latin typeface="Arial" pitchFamily="34" charset="0"/>
-                <a:ea typeface="Arial" pitchFamily="34" charset="-122"/>
-                <a:cs typeface="Arial" pitchFamily="34" charset="-120"/>
-              </a:rPr>
-              <a:t> Summary &amp; confirmation request</a:t>
-            </a:r>
-            <a:endParaRPr lang="en-US" sz="1350" dirty="0"/>
+              <a:t>Step 4 – Review Shows booking summary Asks for confirmation</a:t>
+            </a:r>
           </a:p>
           <a:p>
             <a:pPr marL="342900" indent="-342900">
@@ -6023,18 +6273,7 @@
                 <a:ea typeface="Arial" pitchFamily="34" charset="-122"/>
                 <a:cs typeface="Arial" pitchFamily="34" charset="-120"/>
               </a:rPr>
-              <a:t>Step 5 - Confirmation:</a:t>
-            </a:r>
-            <a:r>
-              <a:rPr lang="en-US" sz="1350" dirty="0">
-                <a:solidFill>
-                  <a:srgbClr val="CBD5E1"/>
-                </a:solidFill>
-                <a:latin typeface="Arial" pitchFamily="34" charset="0"/>
-                <a:ea typeface="Arial" pitchFamily="34" charset="-122"/>
-                <a:cs typeface="Arial" pitchFamily="34" charset="-120"/>
-              </a:rPr>
-              <a:t> Save to DB, send email, booking ID generated</a:t>
+              <a:t>Step 5 – Confirmation Saves to DB, sends email, generates Booking ID Resets session for next booking</a:t>
             </a:r>
             <a:endParaRPr lang="en-US" sz="1350" dirty="0"/>
           </a:p>
@@ -6045,13 +6284,13 @@
   <p:clrMapOvr>
     <a:masterClrMapping/>
   </p:clrMapOvr>
-  <mc:AlternateContent xmlns:mc="http://schemas.openxmlformats.org/markup-compatibility/2006">
-    <mc:Choice xmlns:p159="http://schemas.microsoft.com/office/powerpoint/2015/09/main" Requires="p159">
+  <mc:AlternateContent xmlns:mc="http://schemas.openxmlformats.org/markup-compatibility/2006" xmlns:p159="http://schemas.microsoft.com/office/powerpoint/2015/09/main">
+    <mc:Choice Requires="p159">
       <p:transition xmlns:p14="http://schemas.microsoft.com/office/powerpoint/2010/main" spd="slow" p14:dur="2000">
         <p159:morph option="byObject"/>
       </p:transition>
     </mc:Choice>
-    <mc:Fallback>
+    <mc:Fallback xmlns="">
       <p:transition spd="slow">
         <p:fade/>
       </p:transition>
@@ -6282,13 +6521,13 @@
   <p:clrMapOvr>
     <a:masterClrMapping/>
   </p:clrMapOvr>
-  <mc:AlternateContent xmlns:mc="http://schemas.openxmlformats.org/markup-compatibility/2006">
-    <mc:Choice xmlns:p159="http://schemas.microsoft.com/office/powerpoint/2015/09/main" Requires="p159">
+  <mc:AlternateContent xmlns:mc="http://schemas.openxmlformats.org/markup-compatibility/2006" xmlns:p159="http://schemas.microsoft.com/office/powerpoint/2015/09/main">
+    <mc:Choice Requires="p159">
       <p:transition xmlns:p14="http://schemas.microsoft.com/office/powerpoint/2010/main" spd="slow" p14:dur="2000">
         <p159:morph option="byObject"/>
       </p:transition>
     </mc:Choice>
-    <mc:Fallback>
+    <mc:Fallback xmlns="">
       <p:transition spd="slow">
         <p:fade/>
       </p:transition>
@@ -6487,13 +6726,13 @@
   <p:clrMapOvr>
     <a:masterClrMapping/>
   </p:clrMapOvr>
-  <mc:AlternateContent xmlns:mc="http://schemas.openxmlformats.org/markup-compatibility/2006">
-    <mc:Choice xmlns:p159="http://schemas.microsoft.com/office/powerpoint/2015/09/main" Requires="p159">
+  <mc:AlternateContent xmlns:mc="http://schemas.openxmlformats.org/markup-compatibility/2006" xmlns:p159="http://schemas.microsoft.com/office/powerpoint/2015/09/main">
+    <mc:Choice Requires="p159">
       <p:transition xmlns:p14="http://schemas.microsoft.com/office/powerpoint/2010/main" spd="slow" p14:dur="2000">
         <p159:morph option="byObject"/>
       </p:transition>
     </mc:Choice>
-    <mc:Fallback>
+    <mc:Fallback xmlns="">
       <p:transition spd="slow">
         <p:fade/>
       </p:transition>
@@ -6634,13 +6873,13 @@
   <p:clrMapOvr>
     <a:masterClrMapping/>
   </p:clrMapOvr>
-  <mc:AlternateContent xmlns:mc="http://schemas.openxmlformats.org/markup-compatibility/2006">
-    <mc:Choice xmlns:p159="http://schemas.microsoft.com/office/powerpoint/2015/09/main" Requires="p159">
+  <mc:AlternateContent xmlns:mc="http://schemas.openxmlformats.org/markup-compatibility/2006" xmlns:p159="http://schemas.microsoft.com/office/powerpoint/2015/09/main">
+    <mc:Choice Requires="p159">
       <p:transition xmlns:p14="http://schemas.microsoft.com/office/powerpoint/2010/main" spd="slow" p14:dur="2000">
         <p159:morph option="byObject"/>
       </p:transition>
     </mc:Choice>
-    <mc:Fallback>
+    <mc:Fallback xmlns="">
       <p:transition spd="slow">
         <p:fade/>
       </p:transition>

</xml_diff>